<commit_message>
Adding latest presentation files
</commit_message>
<xml_diff>
--- a/PairTrading.pptx
+++ b/PairTrading.pptx
@@ -5,7 +5,7 @@
     <p:sldMasterId id="2147483659" r:id="rId1"/>
   </p:sldMasterIdLst>
   <p:notesMasterIdLst>
-    <p:notesMasterId r:id="rId17"/>
+    <p:notesMasterId r:id="rId21"/>
   </p:notesMasterIdLst>
   <p:sldIdLst>
     <p:sldId id="276" r:id="rId2"/>
@@ -19,10 +19,14 @@
     <p:sldId id="271" r:id="rId10"/>
     <p:sldId id="262" r:id="rId11"/>
     <p:sldId id="273" r:id="rId12"/>
-    <p:sldId id="269" r:id="rId13"/>
-    <p:sldId id="274" r:id="rId14"/>
-    <p:sldId id="260" r:id="rId15"/>
-    <p:sldId id="261" r:id="rId16"/>
+    <p:sldId id="280" r:id="rId13"/>
+    <p:sldId id="269" r:id="rId14"/>
+    <p:sldId id="279" r:id="rId15"/>
+    <p:sldId id="274" r:id="rId16"/>
+    <p:sldId id="281" r:id="rId17"/>
+    <p:sldId id="261" r:id="rId18"/>
+    <p:sldId id="260" r:id="rId19"/>
+    <p:sldId id="282" r:id="rId20"/>
   </p:sldIdLst>
   <p:sldSz cx="9144000" cy="5143500" type="screen16x9"/>
   <p:notesSz cx="6858000" cy="9144000"/>
@@ -707,6 +711,72 @@
 </file>
 
 <file path=ppt/notesSlides/notesSlide1.xml><?xml version="1.0" encoding="utf-8"?>
+<p:notes xmlns:a="http://schemas.openxmlformats.org/drawingml/2006/main" xmlns:r="http://schemas.openxmlformats.org/officeDocument/2006/relationships" xmlns:p="http://schemas.openxmlformats.org/presentationml/2006/main">
+  <p:cSld>
+    <p:spTree>
+      <p:nvGrpSpPr>
+        <p:cNvPr id="1" name=""/>
+        <p:cNvGrpSpPr/>
+        <p:nvPr/>
+      </p:nvGrpSpPr>
+      <p:grpSpPr>
+        <a:xfrm>
+          <a:off x="0" y="0"/>
+          <a:ext cx="0" cy="0"/>
+          <a:chOff x="0" y="0"/>
+          <a:chExt cx="0" cy="0"/>
+        </a:xfrm>
+      </p:grpSpPr>
+      <p:sp>
+        <p:nvSpPr>
+          <p:cNvPr id="2" name="Slide Image Placeholder 1"/>
+          <p:cNvSpPr>
+            <a:spLocks noGrp="1" noRot="1" noChangeAspect="1"/>
+          </p:cNvSpPr>
+          <p:nvPr>
+            <p:ph type="sldImg"/>
+          </p:nvPr>
+        </p:nvSpPr>
+        <p:spPr>
+          <a:xfrm>
+            <a:off x="381000" y="685800"/>
+            <a:ext cx="6096000" cy="3429000"/>
+          </a:xfrm>
+        </p:spPr>
+      </p:sp>
+      <p:sp>
+        <p:nvSpPr>
+          <p:cNvPr id="3" name="Notes Placeholder 2"/>
+          <p:cNvSpPr>
+            <a:spLocks noGrp="1"/>
+          </p:cNvSpPr>
+          <p:nvPr>
+            <p:ph type="body" idx="1"/>
+          </p:nvPr>
+        </p:nvSpPr>
+        <p:spPr/>
+        <p:txBody>
+          <a:bodyPr/>
+          <a:lstStyle/>
+          <a:p>
+            <a:endParaRPr lang="en-US" dirty="0"/>
+          </a:p>
+        </p:txBody>
+      </p:sp>
+    </p:spTree>
+    <p:extLst>
+      <p:ext uri="{BB962C8B-B14F-4D97-AF65-F5344CB8AC3E}">
+        <p14:creationId xmlns:p14="http://schemas.microsoft.com/office/powerpoint/2010/main" val="743671613"/>
+      </p:ext>
+    </p:extLst>
+  </p:cSld>
+  <p:clrMapOvr>
+    <a:masterClrMapping/>
+  </p:clrMapOvr>
+</p:notes>
+</file>
+
+<file path=ppt/notesSlides/notesSlide2.xml><?xml version="1.0" encoding="utf-8"?>
 <p:notes xmlns:a="http://schemas.openxmlformats.org/drawingml/2006/main" xmlns:r="http://schemas.openxmlformats.org/officeDocument/2006/relationships" xmlns:p="http://schemas.openxmlformats.org/presentationml/2006/main" showMasterSp="0" showMasterPhAnim="0">
   <p:cSld>
     <p:spTree>
@@ -810,7 +880,177 @@
 </p:notes>
 </file>
 
-<file path=ppt/notesSlides/notesSlide2.xml><?xml version="1.0" encoding="utf-8"?>
+<file path=ppt/notesSlides/notesSlide3.xml><?xml version="1.0" encoding="utf-8"?>
+<p:notes xmlns:a="http://schemas.openxmlformats.org/drawingml/2006/main" xmlns:r="http://schemas.openxmlformats.org/officeDocument/2006/relationships" xmlns:p="http://schemas.openxmlformats.org/presentationml/2006/main">
+  <p:cSld>
+    <p:spTree>
+      <p:nvGrpSpPr>
+        <p:cNvPr id="1" name=""/>
+        <p:cNvGrpSpPr/>
+        <p:nvPr/>
+      </p:nvGrpSpPr>
+      <p:grpSpPr>
+        <a:xfrm>
+          <a:off x="0" y="0"/>
+          <a:ext cx="0" cy="0"/>
+          <a:chOff x="0" y="0"/>
+          <a:chExt cx="0" cy="0"/>
+        </a:xfrm>
+      </p:grpSpPr>
+      <p:sp>
+        <p:nvSpPr>
+          <p:cNvPr id="2" name="Slide Image Placeholder 1"/>
+          <p:cNvSpPr>
+            <a:spLocks noGrp="1" noRot="1" noChangeAspect="1"/>
+          </p:cNvSpPr>
+          <p:nvPr>
+            <p:ph type="sldImg"/>
+          </p:nvPr>
+        </p:nvSpPr>
+        <p:spPr>
+          <a:xfrm>
+            <a:off x="381000" y="685800"/>
+            <a:ext cx="6096000" cy="3429000"/>
+          </a:xfrm>
+        </p:spPr>
+      </p:sp>
+      <p:sp>
+        <p:nvSpPr>
+          <p:cNvPr id="3" name="Notes Placeholder 2"/>
+          <p:cNvSpPr>
+            <a:spLocks noGrp="1"/>
+          </p:cNvSpPr>
+          <p:nvPr>
+            <p:ph type="body" idx="1"/>
+          </p:nvPr>
+        </p:nvSpPr>
+        <p:spPr/>
+        <p:txBody>
+          <a:bodyPr/>
+          <a:lstStyle/>
+          <a:p>
+            <a:endParaRPr lang="en-US" dirty="0"/>
+          </a:p>
+        </p:txBody>
+      </p:sp>
+    </p:spTree>
+    <p:extLst>
+      <p:ext uri="{BB962C8B-B14F-4D97-AF65-F5344CB8AC3E}">
+        <p14:creationId xmlns:p14="http://schemas.microsoft.com/office/powerpoint/2010/main" val="3891247316"/>
+      </p:ext>
+    </p:extLst>
+  </p:cSld>
+  <p:clrMapOvr>
+    <a:masterClrMapping/>
+  </p:clrMapOvr>
+</p:notes>
+</file>
+
+<file path=ppt/notesSlides/notesSlide4.xml><?xml version="1.0" encoding="utf-8"?>
+<p:notes xmlns:a="http://schemas.openxmlformats.org/drawingml/2006/main" xmlns:r="http://schemas.openxmlformats.org/officeDocument/2006/relationships" xmlns:p="http://schemas.openxmlformats.org/presentationml/2006/main" showMasterSp="0" showMasterPhAnim="0">
+  <p:cSld>
+    <p:spTree>
+      <p:nvGrpSpPr>
+        <p:cNvPr id="1" name="Shape 80"/>
+        <p:cNvGrpSpPr/>
+        <p:nvPr/>
+      </p:nvGrpSpPr>
+      <p:grpSpPr>
+        <a:xfrm>
+          <a:off x="0" y="0"/>
+          <a:ext cx="0" cy="0"/>
+          <a:chOff x="0" y="0"/>
+          <a:chExt cx="0" cy="0"/>
+        </a:xfrm>
+      </p:grpSpPr>
+      <p:sp>
+        <p:nvSpPr>
+          <p:cNvPr id="81" name="Shape 81"/>
+          <p:cNvSpPr>
+            <a:spLocks noGrp="1" noRot="1" noChangeAspect="1"/>
+          </p:cNvSpPr>
+          <p:nvPr>
+            <p:ph type="sldImg" idx="2"/>
+          </p:nvPr>
+        </p:nvSpPr>
+        <p:spPr>
+          <a:xfrm>
+            <a:off x="381000" y="685800"/>
+            <a:ext cx="6096000" cy="3429000"/>
+          </a:xfrm>
+          <a:custGeom>
+            <a:avLst/>
+            <a:gdLst/>
+            <a:ahLst/>
+            <a:cxnLst/>
+            <a:rect l="0" t="0" r="0" b="0"/>
+            <a:pathLst>
+              <a:path w="120000" h="120000" extrusionOk="0">
+                <a:moveTo>
+                  <a:pt x="0" y="0"/>
+                </a:moveTo>
+                <a:lnTo>
+                  <a:pt x="120000" y="0"/>
+                </a:lnTo>
+                <a:lnTo>
+                  <a:pt x="120000" y="120000"/>
+                </a:lnTo>
+                <a:lnTo>
+                  <a:pt x="0" y="120000"/>
+                </a:lnTo>
+                <a:close/>
+              </a:path>
+            </a:pathLst>
+          </a:custGeom>
+        </p:spPr>
+      </p:sp>
+      <p:sp>
+        <p:nvSpPr>
+          <p:cNvPr id="82" name="Shape 82"/>
+          <p:cNvSpPr txBox="1">
+            <a:spLocks noGrp="1"/>
+          </p:cNvSpPr>
+          <p:nvPr>
+            <p:ph type="body" idx="1"/>
+          </p:nvPr>
+        </p:nvSpPr>
+        <p:spPr>
+          <a:xfrm>
+            <a:off x="685800" y="4343400"/>
+            <a:ext cx="5486400" cy="4114800"/>
+          </a:xfrm>
+          <a:prstGeom prst="rect">
+            <a:avLst/>
+          </a:prstGeom>
+        </p:spPr>
+        <p:txBody>
+          <a:bodyPr spcFirstLastPara="1" wrap="square" lIns="91425" tIns="91425" rIns="91425" bIns="91425" anchor="t" anchorCtr="0">
+            <a:noAutofit/>
+          </a:bodyPr>
+          <a:lstStyle/>
+          <a:p>
+            <a:pPr marL="0" lvl="0" indent="0">
+              <a:spcBef>
+                <a:spcPts val="0"/>
+              </a:spcBef>
+              <a:spcAft>
+                <a:spcPts val="0"/>
+              </a:spcAft>
+              <a:buNone/>
+            </a:pPr>
+            <a:endParaRPr/>
+          </a:p>
+        </p:txBody>
+      </p:sp>
+    </p:spTree>
+  </p:cSld>
+  <p:clrMapOvr>
+    <a:masterClrMapping/>
+  </p:clrMapOvr>
+</p:notes>
+</file>
+
+<file path=ppt/notesSlides/notesSlide5.xml><?xml version="1.0" encoding="utf-8"?>
 <p:notes xmlns:a="http://schemas.openxmlformats.org/drawingml/2006/main" xmlns:r="http://schemas.openxmlformats.org/officeDocument/2006/relationships" xmlns:p="http://schemas.openxmlformats.org/presentationml/2006/main" showMasterSp="0" showMasterPhAnim="0">
   <p:cSld>
     <p:spTree>
@@ -871,110 +1111,6 @@
       <p:sp>
         <p:nvSpPr>
           <p:cNvPr id="76" name="Shape 76"/>
-          <p:cNvSpPr txBox="1">
-            <a:spLocks noGrp="1"/>
-          </p:cNvSpPr>
-          <p:nvPr>
-            <p:ph type="body" idx="1"/>
-          </p:nvPr>
-        </p:nvSpPr>
-        <p:spPr>
-          <a:xfrm>
-            <a:off x="685800" y="4343400"/>
-            <a:ext cx="5486400" cy="4114800"/>
-          </a:xfrm>
-          <a:prstGeom prst="rect">
-            <a:avLst/>
-          </a:prstGeom>
-        </p:spPr>
-        <p:txBody>
-          <a:bodyPr spcFirstLastPara="1" wrap="square" lIns="91425" tIns="91425" rIns="91425" bIns="91425" anchor="t" anchorCtr="0">
-            <a:noAutofit/>
-          </a:bodyPr>
-          <a:lstStyle/>
-          <a:p>
-            <a:pPr marL="0" lvl="0" indent="0">
-              <a:spcBef>
-                <a:spcPts val="0"/>
-              </a:spcBef>
-              <a:spcAft>
-                <a:spcPts val="0"/>
-              </a:spcAft>
-              <a:buNone/>
-            </a:pPr>
-            <a:endParaRPr/>
-          </a:p>
-        </p:txBody>
-      </p:sp>
-    </p:spTree>
-  </p:cSld>
-  <p:clrMapOvr>
-    <a:masterClrMapping/>
-  </p:clrMapOvr>
-</p:notes>
-</file>
-
-<file path=ppt/notesSlides/notesSlide3.xml><?xml version="1.0" encoding="utf-8"?>
-<p:notes xmlns:a="http://schemas.openxmlformats.org/drawingml/2006/main" xmlns:r="http://schemas.openxmlformats.org/officeDocument/2006/relationships" xmlns:p="http://schemas.openxmlformats.org/presentationml/2006/main" showMasterSp="0" showMasterPhAnim="0">
-  <p:cSld>
-    <p:spTree>
-      <p:nvGrpSpPr>
-        <p:cNvPr id="1" name="Shape 80"/>
-        <p:cNvGrpSpPr/>
-        <p:nvPr/>
-      </p:nvGrpSpPr>
-      <p:grpSpPr>
-        <a:xfrm>
-          <a:off x="0" y="0"/>
-          <a:ext cx="0" cy="0"/>
-          <a:chOff x="0" y="0"/>
-          <a:chExt cx="0" cy="0"/>
-        </a:xfrm>
-      </p:grpSpPr>
-      <p:sp>
-        <p:nvSpPr>
-          <p:cNvPr id="81" name="Shape 81"/>
-          <p:cNvSpPr>
-            <a:spLocks noGrp="1" noRot="1" noChangeAspect="1"/>
-          </p:cNvSpPr>
-          <p:nvPr>
-            <p:ph type="sldImg" idx="2"/>
-          </p:nvPr>
-        </p:nvSpPr>
-        <p:spPr>
-          <a:xfrm>
-            <a:off x="381000" y="685800"/>
-            <a:ext cx="6096000" cy="3429000"/>
-          </a:xfrm>
-          <a:custGeom>
-            <a:avLst/>
-            <a:gdLst/>
-            <a:ahLst/>
-            <a:cxnLst/>
-            <a:rect l="0" t="0" r="0" b="0"/>
-            <a:pathLst>
-              <a:path w="120000" h="120000" extrusionOk="0">
-                <a:moveTo>
-                  <a:pt x="0" y="0"/>
-                </a:moveTo>
-                <a:lnTo>
-                  <a:pt x="120000" y="0"/>
-                </a:lnTo>
-                <a:lnTo>
-                  <a:pt x="120000" y="120000"/>
-                </a:lnTo>
-                <a:lnTo>
-                  <a:pt x="0" y="120000"/>
-                </a:lnTo>
-                <a:close/>
-              </a:path>
-            </a:pathLst>
-          </a:custGeom>
-        </p:spPr>
-      </p:sp>
-      <p:sp>
-        <p:nvSpPr>
-          <p:cNvPr id="82" name="Shape 82"/>
           <p:cNvSpPr txBox="1">
             <a:spLocks noGrp="1"/>
           </p:cNvSpPr>
@@ -6124,7 +6260,7 @@
         </p:nvSpPr>
         <p:spPr>
           <a:xfrm>
-            <a:off x="533403" y="2652318"/>
+            <a:off x="324395" y="2652318"/>
             <a:ext cx="8520600" cy="792600"/>
           </a:xfrm>
         </p:spPr>
@@ -6212,9 +6348,7 @@
             <a:r>
               <a:rPr lang="en-US" sz="2400" b="1" dirty="0">
                 <a:solidFill>
-                  <a:schemeClr val="accent5">
-                    <a:lumMod val="75000"/>
-                  </a:schemeClr>
+                  <a:schemeClr val="accent5"/>
                 </a:solidFill>
               </a:rPr>
               <a:t>Naïve </a:t>
@@ -6222,9 +6356,7 @@
             <a:r>
               <a:rPr lang="en" sz="2400" b="1" dirty="0">
                 <a:solidFill>
-                  <a:schemeClr val="accent5">
-                    <a:lumMod val="75000"/>
-                  </a:schemeClr>
+                  <a:schemeClr val="accent5"/>
                 </a:solidFill>
               </a:rPr>
               <a:t>Trading </a:t>
@@ -6232,18 +6364,14 @@
             <a:r>
               <a:rPr lang="en-US" sz="2400" b="1" dirty="0">
                 <a:solidFill>
-                  <a:schemeClr val="accent5">
-                    <a:lumMod val="75000"/>
-                  </a:schemeClr>
+                  <a:schemeClr val="accent5"/>
                 </a:solidFill>
               </a:rPr>
               <a:t>Logic</a:t>
             </a:r>
             <a:endParaRPr sz="2400" dirty="0">
               <a:solidFill>
-                <a:schemeClr val="accent5">
-                  <a:lumMod val="75000"/>
-                </a:schemeClr>
+                <a:schemeClr val="accent5"/>
               </a:solidFill>
             </a:endParaRPr>
           </a:p>
@@ -6309,10 +6437,18 @@
             <a:r>
               <a:rPr lang="en-US" sz="1400" b="1" dirty="0">
                 <a:solidFill>
+                  <a:srgbClr val="00B050"/>
+                </a:solidFill>
+              </a:rPr>
+              <a:t>BUY</a:t>
+            </a:r>
+            <a:r>
+              <a:rPr lang="en-US" sz="1400" b="1" dirty="0">
+                <a:solidFill>
                   <a:srgbClr val="00FF00"/>
                 </a:solidFill>
               </a:rPr>
-              <a:t>BUY </a:t>
+              <a:t> </a:t>
             </a:r>
           </a:p>
           <a:p>
@@ -6362,20 +6498,50 @@
             </a:r>
             <a:r>
               <a:rPr lang="en-US" dirty="0"/>
-              <a:t> to place orders to trade. Give % of asset to trade from -1.0 to 1.0. Negative </a:t>
+              <a:t> to place orders to trade. Give % of asset to trade from -1.0 to 1.0. </a:t>
             </a:r>
             <a:r>
               <a:rPr lang="en-US" dirty="0">
+                <a:solidFill>
+                  <a:srgbClr val="C00000"/>
+                </a:solidFill>
+              </a:rPr>
+              <a:t>Negative </a:t>
+            </a:r>
+            <a:r>
+              <a:rPr lang="en-US" dirty="0">
+                <a:solidFill>
+                  <a:srgbClr val="C00000"/>
+                </a:solidFill>
                 <a:sym typeface="Wingdings" panose="05000000000000000000" pitchFamily="2" charset="2"/>
               </a:rPr>
               <a:t> </a:t>
             </a:r>
             <a:r>
+              <a:rPr lang="en-US" dirty="0">
+                <a:solidFill>
+                  <a:srgbClr val="C00000"/>
+                </a:solidFill>
+              </a:rPr>
+              <a:t>Sell </a:t>
+            </a:r>
+            <a:r>
               <a:rPr lang="en-US" dirty="0"/>
-              <a:t>Sell and Positive </a:t>
+              <a:t>and </a:t>
             </a:r>
             <a:r>
               <a:rPr lang="en-US" dirty="0">
+                <a:solidFill>
+                  <a:srgbClr val="00B050"/>
+                </a:solidFill>
+              </a:rPr>
+              <a:t>Positive </a:t>
+            </a:r>
+            <a:r>
+              <a:rPr lang="en-US" dirty="0">
+                <a:solidFill>
+                  <a:srgbClr val="00B050"/>
+                </a:solidFill>
                 <a:sym typeface="Wingdings" panose="05000000000000000000" pitchFamily="2" charset="2"/>
               </a:rPr>
               <a:t> Buy</a:t>
@@ -6518,9 +6684,7 @@
             <a:r>
               <a:rPr lang="en-US" sz="2400" b="1" dirty="0">
                 <a:solidFill>
-                  <a:schemeClr val="accent5">
-                    <a:lumMod val="75000"/>
-                  </a:schemeClr>
+                  <a:schemeClr val="accent5"/>
                 </a:solidFill>
               </a:rPr>
               <a:t>Naive Trading Algorithm</a:t>
@@ -6698,6 +6862,128 @@
           <p:cNvPr id="2" name="Title 1">
             <a:extLst>
               <a:ext uri="{FF2B5EF4-FFF2-40B4-BE49-F238E27FC236}">
+                <a16:creationId xmlns:a16="http://schemas.microsoft.com/office/drawing/2014/main" id="{811603B4-6C1E-4351-A4AD-7A529D601506}"/>
+              </a:ext>
+            </a:extLst>
+          </p:cNvPr>
+          <p:cNvSpPr>
+            <a:spLocks noGrp="1"/>
+          </p:cNvSpPr>
+          <p:nvPr>
+            <p:ph type="title"/>
+          </p:nvPr>
+        </p:nvSpPr>
+        <p:spPr>
+          <a:xfrm>
+            <a:off x="92244" y="88097"/>
+            <a:ext cx="8520600" cy="572700"/>
+          </a:xfrm>
+        </p:spPr>
+        <p:txBody>
+          <a:bodyPr/>
+          <a:lstStyle/>
+          <a:p>
+            <a:r>
+              <a:rPr lang="en-US" sz="2400" b="1" dirty="0">
+                <a:solidFill>
+                  <a:schemeClr val="accent5"/>
+                </a:solidFill>
+              </a:rPr>
+              <a:t>Build Algorithm Results</a:t>
+            </a:r>
+          </a:p>
+        </p:txBody>
+      </p:sp>
+      <p:sp>
+        <p:nvSpPr>
+          <p:cNvPr id="3" name="Text Placeholder 2">
+            <a:extLst>
+              <a:ext uri="{FF2B5EF4-FFF2-40B4-BE49-F238E27FC236}">
+                <a16:creationId xmlns:a16="http://schemas.microsoft.com/office/drawing/2014/main" id="{72FCBD59-4A4A-4702-9145-83E0A968BEA9}"/>
+              </a:ext>
+            </a:extLst>
+          </p:cNvPr>
+          <p:cNvSpPr>
+            <a:spLocks noGrp="1"/>
+          </p:cNvSpPr>
+          <p:nvPr>
+            <p:ph type="body" idx="1"/>
+          </p:nvPr>
+        </p:nvSpPr>
+        <p:spPr/>
+        <p:txBody>
+          <a:bodyPr/>
+          <a:lstStyle/>
+          <a:p>
+            <a:endParaRPr lang="en-US"/>
+          </a:p>
+        </p:txBody>
+      </p:sp>
+      <p:pic>
+        <p:nvPicPr>
+          <p:cNvPr id="4" name="Picture 3">
+            <a:extLst>
+              <a:ext uri="{FF2B5EF4-FFF2-40B4-BE49-F238E27FC236}">
+                <a16:creationId xmlns:a16="http://schemas.microsoft.com/office/drawing/2014/main" id="{C0975AF4-28A0-4325-A9BF-7BB9DA3477A5}"/>
+              </a:ext>
+            </a:extLst>
+          </p:cNvPr>
+          <p:cNvPicPr>
+            <a:picLocks noChangeAspect="1"/>
+          </p:cNvPicPr>
+          <p:nvPr/>
+        </p:nvPicPr>
+        <p:blipFill>
+          <a:blip r:embed="rId3"/>
+          <a:stretch>
+            <a:fillRect/>
+          </a:stretch>
+        </p:blipFill>
+        <p:spPr>
+          <a:xfrm>
+            <a:off x="92244" y="660798"/>
+            <a:ext cx="8937490" cy="4381465"/>
+          </a:xfrm>
+          <a:prstGeom prst="rect">
+            <a:avLst/>
+          </a:prstGeom>
+        </p:spPr>
+      </p:pic>
+    </p:spTree>
+    <p:extLst>
+      <p:ext uri="{BB962C8B-B14F-4D97-AF65-F5344CB8AC3E}">
+        <p14:creationId xmlns:p14="http://schemas.microsoft.com/office/powerpoint/2010/main" val="790841659"/>
+      </p:ext>
+    </p:extLst>
+  </p:cSld>
+  <p:clrMapOvr>
+    <a:masterClrMapping/>
+  </p:clrMapOvr>
+</p:sld>
+</file>
+
+<file path=ppt/slides/slide13.xml><?xml version="1.0" encoding="utf-8"?>
+<p:sld xmlns:a="http://schemas.openxmlformats.org/drawingml/2006/main" xmlns:r="http://schemas.openxmlformats.org/officeDocument/2006/relationships" xmlns:p="http://schemas.openxmlformats.org/presentationml/2006/main">
+  <p:cSld>
+    <p:spTree>
+      <p:nvGrpSpPr>
+        <p:cNvPr id="1" name=""/>
+        <p:cNvGrpSpPr/>
+        <p:nvPr/>
+      </p:nvGrpSpPr>
+      <p:grpSpPr>
+        <a:xfrm>
+          <a:off x="0" y="0"/>
+          <a:ext cx="0" cy="0"/>
+          <a:chOff x="0" y="0"/>
+          <a:chExt cx="0" cy="0"/>
+        </a:xfrm>
+      </p:grpSpPr>
+      <p:sp>
+        <p:nvSpPr>
+          <p:cNvPr id="2" name="Title 1">
+            <a:extLst>
+              <a:ext uri="{FF2B5EF4-FFF2-40B4-BE49-F238E27FC236}">
                 <a16:creationId xmlns:a16="http://schemas.microsoft.com/office/drawing/2014/main" id="{10FB8FA7-6843-4868-8494-F58D6BA9AE91}"/>
               </a:ext>
             </a:extLst>
@@ -6709,13 +6995,24 @@
             <p:ph type="title"/>
           </p:nvPr>
         </p:nvSpPr>
-        <p:spPr/>
+        <p:spPr>
+          <a:xfrm>
+            <a:off x="311700" y="194225"/>
+            <a:ext cx="8520600" cy="572700"/>
+          </a:xfrm>
+        </p:spPr>
         <p:txBody>
           <a:bodyPr/>
           <a:lstStyle/>
           <a:p>
             <a:r>
-              <a:rPr lang="en-US" b="1" dirty="0"/>
+              <a:rPr lang="en-US" sz="2400" b="1" dirty="0">
+                <a:solidFill>
+                  <a:schemeClr val="accent5">
+                    <a:lumMod val="75000"/>
+                  </a:schemeClr>
+                </a:solidFill>
+              </a:rPr>
               <a:t>Backtest Analysis</a:t>
             </a:r>
           </a:p>
@@ -6737,18 +7034,148 @@
             <p:ph type="body" idx="1"/>
           </p:nvPr>
         </p:nvSpPr>
-        <p:spPr/>
+        <p:spPr>
+          <a:xfrm>
+            <a:off x="114953" y="849420"/>
+            <a:ext cx="8840942" cy="3416400"/>
+          </a:xfrm>
+        </p:spPr>
         <p:txBody>
           <a:bodyPr/>
           <a:lstStyle/>
           <a:p>
             <a:r>
-              <a:rPr lang="en-US" dirty="0"/>
-              <a:t>https://www.quantopian.com/tutorials/getting-started#lesson8</a:t>
-            </a:r>
+              <a:rPr lang="en-US" sz="1600" dirty="0"/>
+              <a:t>“</a:t>
+            </a:r>
+            <a:r>
+              <a:rPr lang="en-US" sz="1600" b="1" dirty="0"/>
+              <a:t>Run Full Backtest</a:t>
+            </a:r>
+            <a:r>
+              <a:rPr lang="en-US" sz="1600" dirty="0"/>
+              <a:t>” runs an event loop </a:t>
+            </a:r>
+            <a:r>
+              <a:rPr lang="en-US" sz="1600" b="1" dirty="0"/>
+              <a:t>handle_data() </a:t>
+            </a:r>
+            <a:r>
+              <a:rPr lang="en-US" sz="1600" dirty="0"/>
+              <a:t>and generates metrics like deeper risk metrics, position information, transactions, and more.</a:t>
+            </a:r>
+          </a:p>
+          <a:p>
+            <a:endParaRPr lang="en-US" sz="1600" dirty="0"/>
+          </a:p>
+          <a:p>
+            <a:r>
+              <a:rPr lang="en-US" sz="1600" dirty="0"/>
+              <a:t>Common metrics are % Total Returns, Alpha, Beta, Sharpe, % Max Drawdown, etc.</a:t>
+            </a:r>
+          </a:p>
+          <a:p>
+            <a:endParaRPr lang="en-US" sz="1600" dirty="0"/>
+          </a:p>
+          <a:p>
+            <a:r>
+              <a:rPr lang="en-US" sz="1600" b="1" dirty="0"/>
+              <a:t>Alphalens</a:t>
+            </a:r>
+            <a:r>
+              <a:rPr lang="en-US" sz="1600" dirty="0"/>
+              <a:t> is a python library used for performance analysis after predictive stock factors mainly Alpha </a:t>
+            </a:r>
+            <a:r>
+              <a:rPr lang="el-GR" dirty="0"/>
+              <a:t>α</a:t>
+            </a:r>
+            <a:r>
+              <a:rPr lang="en-US" sz="1600" dirty="0"/>
+              <a:t>.</a:t>
+            </a:r>
+          </a:p>
+          <a:p>
+            <a:endParaRPr lang="en-US" sz="1600" dirty="0"/>
+          </a:p>
+          <a:p>
+            <a:r>
+              <a:rPr lang="en-US" sz="1600" b="1" dirty="0"/>
+              <a:t>Pyfolio</a:t>
+            </a:r>
+            <a:r>
+              <a:rPr lang="en-US" sz="1600" dirty="0"/>
+              <a:t> is also a python library for performance and risk analysis of financial portfolios.</a:t>
+            </a:r>
+          </a:p>
+          <a:p>
+            <a:pPr marL="114300" indent="0">
+              <a:buNone/>
+            </a:pPr>
+            <a:r>
+              <a:rPr lang="en-US" sz="1600" dirty="0"/>
+              <a:t>      Note: This alphanumeric string can be found in the URL of backtest.</a:t>
+            </a:r>
+          </a:p>
+          <a:p>
+            <a:pPr marL="114300" indent="0">
+              <a:buNone/>
+            </a:pPr>
+            <a:endParaRPr lang="en-US" sz="1600" dirty="0"/>
+          </a:p>
+          <a:p>
+            <a:endParaRPr lang="en-US" sz="1600" dirty="0"/>
+          </a:p>
+          <a:p>
+            <a:endParaRPr lang="en-US" sz="1600" dirty="0"/>
+          </a:p>
+          <a:p>
+            <a:endParaRPr lang="en-US" sz="1600" dirty="0"/>
+          </a:p>
+          <a:p>
+            <a:endParaRPr lang="en-US" sz="1600" dirty="0"/>
+          </a:p>
+          <a:p>
+            <a:endParaRPr lang="en-US" sz="1600" dirty="0"/>
+          </a:p>
+          <a:p>
+            <a:pPr marL="114300" indent="0">
+              <a:buNone/>
+            </a:pPr>
+            <a:endParaRPr lang="en-US" sz="1600" dirty="0"/>
           </a:p>
         </p:txBody>
       </p:sp>
+      <p:pic>
+        <p:nvPicPr>
+          <p:cNvPr id="5" name="Picture 4">
+            <a:extLst>
+              <a:ext uri="{FF2B5EF4-FFF2-40B4-BE49-F238E27FC236}">
+                <a16:creationId xmlns:a16="http://schemas.microsoft.com/office/drawing/2014/main" id="{0CF79D7D-80E0-4F70-A0FC-88FC968D4428}"/>
+              </a:ext>
+            </a:extLst>
+          </p:cNvPr>
+          <p:cNvPicPr>
+            <a:picLocks noChangeAspect="1"/>
+          </p:cNvPicPr>
+          <p:nvPr/>
+        </p:nvPicPr>
+        <p:blipFill>
+          <a:blip r:embed="rId2"/>
+          <a:stretch>
+            <a:fillRect/>
+          </a:stretch>
+        </p:blipFill>
+        <p:spPr>
+          <a:xfrm>
+            <a:off x="2466266" y="4007443"/>
+            <a:ext cx="4178481" cy="650424"/>
+          </a:xfrm>
+          <a:prstGeom prst="rect">
+            <a:avLst/>
+          </a:prstGeom>
+        </p:spPr>
+      </p:pic>
     </p:spTree>
     <p:extLst>
       <p:ext uri="{BB962C8B-B14F-4D97-AF65-F5344CB8AC3E}">
@@ -6762,7 +7189,129 @@
 </p:sld>
 </file>
 
-<file path=ppt/slides/slide13.xml><?xml version="1.0" encoding="utf-8"?>
+<file path=ppt/slides/slide14.xml><?xml version="1.0" encoding="utf-8"?>
+<p:sld xmlns:a="http://schemas.openxmlformats.org/drawingml/2006/main" xmlns:r="http://schemas.openxmlformats.org/officeDocument/2006/relationships" xmlns:p="http://schemas.openxmlformats.org/presentationml/2006/main">
+  <p:cSld>
+    <p:spTree>
+      <p:nvGrpSpPr>
+        <p:cNvPr id="1" name=""/>
+        <p:cNvGrpSpPr/>
+        <p:nvPr/>
+      </p:nvGrpSpPr>
+      <p:grpSpPr>
+        <a:xfrm>
+          <a:off x="0" y="0"/>
+          <a:ext cx="0" cy="0"/>
+          <a:chOff x="0" y="0"/>
+          <a:chExt cx="0" cy="0"/>
+        </a:xfrm>
+      </p:grpSpPr>
+      <p:sp>
+        <p:nvSpPr>
+          <p:cNvPr id="2" name="Title 1">
+            <a:extLst>
+              <a:ext uri="{FF2B5EF4-FFF2-40B4-BE49-F238E27FC236}">
+                <a16:creationId xmlns:a16="http://schemas.microsoft.com/office/drawing/2014/main" id="{AC6502EE-D217-4B87-9C0D-B8F6ACEC92A6}"/>
+              </a:ext>
+            </a:extLst>
+          </p:cNvPr>
+          <p:cNvSpPr>
+            <a:spLocks noGrp="1"/>
+          </p:cNvSpPr>
+          <p:nvPr>
+            <p:ph type="title"/>
+          </p:nvPr>
+        </p:nvSpPr>
+        <p:spPr>
+          <a:xfrm>
+            <a:off x="212425" y="74041"/>
+            <a:ext cx="8520600" cy="572700"/>
+          </a:xfrm>
+        </p:spPr>
+        <p:txBody>
+          <a:bodyPr/>
+          <a:lstStyle/>
+          <a:p>
+            <a:r>
+              <a:rPr lang="en-US" sz="2400" b="1" dirty="0">
+                <a:solidFill>
+                  <a:schemeClr val="accent5"/>
+                </a:solidFill>
+              </a:rPr>
+              <a:t>Backtesting Results</a:t>
+            </a:r>
+          </a:p>
+        </p:txBody>
+      </p:sp>
+      <p:sp>
+        <p:nvSpPr>
+          <p:cNvPr id="3" name="Text Placeholder 2">
+            <a:extLst>
+              <a:ext uri="{FF2B5EF4-FFF2-40B4-BE49-F238E27FC236}">
+                <a16:creationId xmlns:a16="http://schemas.microsoft.com/office/drawing/2014/main" id="{90A561C1-E3C6-4DF3-81AF-3F0B6D206EC7}"/>
+              </a:ext>
+            </a:extLst>
+          </p:cNvPr>
+          <p:cNvSpPr>
+            <a:spLocks noGrp="1"/>
+          </p:cNvSpPr>
+          <p:nvPr>
+            <p:ph type="body" idx="1"/>
+          </p:nvPr>
+        </p:nvSpPr>
+        <p:spPr/>
+        <p:txBody>
+          <a:bodyPr/>
+          <a:lstStyle/>
+          <a:p>
+            <a:endParaRPr lang="en-US"/>
+          </a:p>
+        </p:txBody>
+      </p:sp>
+      <p:pic>
+        <p:nvPicPr>
+          <p:cNvPr id="4" name="Picture 3">
+            <a:extLst>
+              <a:ext uri="{FF2B5EF4-FFF2-40B4-BE49-F238E27FC236}">
+                <a16:creationId xmlns:a16="http://schemas.microsoft.com/office/drawing/2014/main" id="{839E625F-49F0-4663-92DC-04AF14152E64}"/>
+              </a:ext>
+            </a:extLst>
+          </p:cNvPr>
+          <p:cNvPicPr>
+            <a:picLocks noChangeAspect="1"/>
+          </p:cNvPicPr>
+          <p:nvPr/>
+        </p:nvPicPr>
+        <p:blipFill>
+          <a:blip r:embed="rId2"/>
+          <a:stretch>
+            <a:fillRect/>
+          </a:stretch>
+        </p:blipFill>
+        <p:spPr>
+          <a:xfrm>
+            <a:off x="120178" y="648021"/>
+            <a:ext cx="8898419" cy="4359627"/>
+          </a:xfrm>
+          <a:prstGeom prst="rect">
+            <a:avLst/>
+          </a:prstGeom>
+        </p:spPr>
+      </p:pic>
+    </p:spTree>
+    <p:extLst>
+      <p:ext uri="{BB962C8B-B14F-4D97-AF65-F5344CB8AC3E}">
+        <p14:creationId xmlns:p14="http://schemas.microsoft.com/office/powerpoint/2010/main" val="4090903548"/>
+      </p:ext>
+    </p:extLst>
+  </p:cSld>
+  <p:clrMapOvr>
+    <a:masterClrMapping/>
+  </p:clrMapOvr>
+</p:sld>
+</file>
+
+<file path=ppt/slides/slide15.xml><?xml version="1.0" encoding="utf-8"?>
 <p:sld xmlns:a="http://schemas.openxmlformats.org/drawingml/2006/main" xmlns:r="http://schemas.openxmlformats.org/officeDocument/2006/relationships" xmlns:p="http://schemas.openxmlformats.org/presentationml/2006/main">
   <p:cSld>
     <p:spTree>
@@ -6801,7 +7350,11 @@
           <a:lstStyle/>
           <a:p>
             <a:r>
-              <a:rPr lang="en-US" b="1" dirty="0"/>
+              <a:rPr lang="en-US" sz="2400" b="1" dirty="0">
+                <a:solidFill>
+                  <a:schemeClr val="accent5"/>
+                </a:solidFill>
+              </a:rPr>
               <a:t>References</a:t>
             </a:r>
           </a:p>
@@ -6828,7 +7381,42 @@
           <a:bodyPr/>
           <a:lstStyle/>
           <a:p>
-            <a:endParaRPr lang="en-US" dirty="0"/>
+            <a:r>
+              <a:rPr lang="en-US" sz="1600" dirty="0" err="1"/>
+              <a:t>Quantopian</a:t>
+            </a:r>
+            <a:r>
+              <a:rPr lang="en-US" sz="1600" dirty="0"/>
+              <a:t> API Reference: </a:t>
+            </a:r>
+            <a:r>
+              <a:rPr lang="en-US" sz="1600" dirty="0">
+                <a:hlinkClick r:id="rId2"/>
+              </a:rPr>
+              <a:t>https://www.quantopian.com/help</a:t>
+            </a:r>
+            <a:r>
+              <a:rPr lang="en-US" sz="1600" dirty="0"/>
+              <a:t> </a:t>
+            </a:r>
+          </a:p>
+          <a:p>
+            <a:pPr marL="114300" indent="0">
+              <a:buNone/>
+            </a:pPr>
+            <a:endParaRPr lang="en-US" sz="1600" dirty="0"/>
+          </a:p>
+          <a:p>
+            <a:r>
+              <a:rPr lang="en-US" sz="1600" dirty="0"/>
+              <a:t>https://www.investopedia.com/ask/answers/09/high-frequency-trading.asp</a:t>
+            </a:r>
+          </a:p>
+          <a:p>
+            <a:pPr marL="114300" indent="0">
+              <a:buNone/>
+            </a:pPr>
+            <a:endParaRPr lang="en-US" sz="1600" dirty="0"/>
           </a:p>
         </p:txBody>
       </p:sp>
@@ -6845,7 +7433,319 @@
 </p:sld>
 </file>
 
-<file path=ppt/slides/slide14.xml><?xml version="1.0" encoding="utf-8"?>
+<file path=ppt/slides/slide16.xml><?xml version="1.0" encoding="utf-8"?>
+<p:sld xmlns:a="http://schemas.openxmlformats.org/drawingml/2006/main" xmlns:r="http://schemas.openxmlformats.org/officeDocument/2006/relationships" xmlns:p="http://schemas.openxmlformats.org/presentationml/2006/main">
+  <p:cSld>
+    <p:spTree>
+      <p:nvGrpSpPr>
+        <p:cNvPr id="1" name=""/>
+        <p:cNvGrpSpPr/>
+        <p:nvPr/>
+      </p:nvGrpSpPr>
+      <p:grpSpPr>
+        <a:xfrm>
+          <a:off x="0" y="0"/>
+          <a:ext cx="0" cy="0"/>
+          <a:chOff x="0" y="0"/>
+          <a:chExt cx="0" cy="0"/>
+        </a:xfrm>
+      </p:grpSpPr>
+      <p:sp>
+        <p:nvSpPr>
+          <p:cNvPr id="2" name="Title 1">
+            <a:extLst>
+              <a:ext uri="{FF2B5EF4-FFF2-40B4-BE49-F238E27FC236}">
+                <a16:creationId xmlns:a16="http://schemas.microsoft.com/office/drawing/2014/main" id="{250C16AF-AD19-483C-BDF4-BA0EF821BF94}"/>
+              </a:ext>
+            </a:extLst>
+          </p:cNvPr>
+          <p:cNvSpPr>
+            <a:spLocks noGrp="1"/>
+          </p:cNvSpPr>
+          <p:nvPr>
+            <p:ph type="title"/>
+          </p:nvPr>
+        </p:nvSpPr>
+        <p:spPr>
+          <a:xfrm>
+            <a:off x="311700" y="2326077"/>
+            <a:ext cx="8520600" cy="572700"/>
+          </a:xfrm>
+        </p:spPr>
+        <p:txBody>
+          <a:bodyPr/>
+          <a:lstStyle/>
+          <a:p>
+            <a:pPr algn="ctr"/>
+            <a:r>
+              <a:rPr lang="en-US" b="1" dirty="0">
+                <a:solidFill>
+                  <a:schemeClr val="accent5"/>
+                </a:solidFill>
+              </a:rPr>
+              <a:t>Thank you</a:t>
+            </a:r>
+          </a:p>
+        </p:txBody>
+      </p:sp>
+      <p:sp>
+        <p:nvSpPr>
+          <p:cNvPr id="4" name="TextBox 3">
+            <a:extLst>
+              <a:ext uri="{FF2B5EF4-FFF2-40B4-BE49-F238E27FC236}">
+                <a16:creationId xmlns:a16="http://schemas.microsoft.com/office/drawing/2014/main" id="{3CF3A701-3597-4E2A-8E40-74FC55058586}"/>
+              </a:ext>
+            </a:extLst>
+          </p:cNvPr>
+          <p:cNvSpPr txBox="1"/>
+          <p:nvPr/>
+        </p:nvSpPr>
+        <p:spPr>
+          <a:xfrm>
+            <a:off x="6876288" y="4389120"/>
+            <a:ext cx="1699504" cy="307777"/>
+          </a:xfrm>
+          <a:prstGeom prst="rect">
+            <a:avLst/>
+          </a:prstGeom>
+          <a:noFill/>
+        </p:spPr>
+        <p:txBody>
+          <a:bodyPr wrap="none" rtlCol="0">
+            <a:spAutoFit/>
+          </a:bodyPr>
+          <a:lstStyle/>
+          <a:p>
+            <a:r>
+              <a:rPr lang="en-US" dirty="0"/>
+              <a:t>rchin001@odu.edu</a:t>
+            </a:r>
+          </a:p>
+        </p:txBody>
+      </p:sp>
+    </p:spTree>
+    <p:extLst>
+      <p:ext uri="{BB962C8B-B14F-4D97-AF65-F5344CB8AC3E}">
+        <p14:creationId xmlns:p14="http://schemas.microsoft.com/office/powerpoint/2010/main" val="2817419584"/>
+      </p:ext>
+    </p:extLst>
+  </p:cSld>
+  <p:clrMapOvr>
+    <a:masterClrMapping/>
+  </p:clrMapOvr>
+</p:sld>
+</file>
+
+<file path=ppt/slides/slide17.xml><?xml version="1.0" encoding="utf-8"?>
+<p:sld xmlns:a="http://schemas.openxmlformats.org/drawingml/2006/main" xmlns:r="http://schemas.openxmlformats.org/officeDocument/2006/relationships" xmlns:p="http://schemas.openxmlformats.org/presentationml/2006/main">
+  <p:cSld>
+    <p:spTree>
+      <p:nvGrpSpPr>
+        <p:cNvPr id="1" name="Shape 83"/>
+        <p:cNvGrpSpPr/>
+        <p:nvPr/>
+      </p:nvGrpSpPr>
+      <p:grpSpPr>
+        <a:xfrm>
+          <a:off x="0" y="0"/>
+          <a:ext cx="0" cy="0"/>
+          <a:chOff x="0" y="0"/>
+          <a:chExt cx="0" cy="0"/>
+        </a:xfrm>
+      </p:grpSpPr>
+      <p:sp>
+        <p:nvSpPr>
+          <p:cNvPr id="84" name="Shape 84"/>
+          <p:cNvSpPr txBox="1">
+            <a:spLocks noGrp="1"/>
+          </p:cNvSpPr>
+          <p:nvPr>
+            <p:ph type="title"/>
+          </p:nvPr>
+        </p:nvSpPr>
+        <p:spPr>
+          <a:xfrm>
+            <a:off x="311700" y="445025"/>
+            <a:ext cx="8520600" cy="572700"/>
+          </a:xfrm>
+          <a:prstGeom prst="rect">
+            <a:avLst/>
+          </a:prstGeom>
+        </p:spPr>
+        <p:txBody>
+          <a:bodyPr spcFirstLastPara="1" wrap="square" lIns="91425" tIns="91425" rIns="91425" bIns="91425" anchor="t" anchorCtr="0">
+            <a:noAutofit/>
+          </a:bodyPr>
+          <a:lstStyle/>
+          <a:p>
+            <a:pPr marL="0" lvl="0" indent="0">
+              <a:spcBef>
+                <a:spcPts val="0"/>
+              </a:spcBef>
+              <a:spcAft>
+                <a:spcPts val="0"/>
+              </a:spcAft>
+              <a:buNone/>
+            </a:pPr>
+            <a:r>
+              <a:rPr lang="en" dirty="0"/>
+              <a:t>Portfolio Optimization</a:t>
+            </a:r>
+            <a:endParaRPr dirty="0"/>
+          </a:p>
+        </p:txBody>
+      </p:sp>
+      <p:sp>
+        <p:nvSpPr>
+          <p:cNvPr id="85" name="Shape 85"/>
+          <p:cNvSpPr txBox="1">
+            <a:spLocks noGrp="1"/>
+          </p:cNvSpPr>
+          <p:nvPr>
+            <p:ph type="body" idx="1"/>
+          </p:nvPr>
+        </p:nvSpPr>
+        <p:spPr>
+          <a:xfrm>
+            <a:off x="311700" y="1152475"/>
+            <a:ext cx="4848511" cy="3416400"/>
+          </a:xfrm>
+          <a:prstGeom prst="rect">
+            <a:avLst/>
+          </a:prstGeom>
+        </p:spPr>
+        <p:txBody>
+          <a:bodyPr spcFirstLastPara="1" wrap="square" lIns="91425" tIns="91425" rIns="91425" bIns="91425" anchor="t" anchorCtr="0">
+            <a:noAutofit/>
+          </a:bodyPr>
+          <a:lstStyle/>
+          <a:p>
+            <a:pPr marL="0" lvl="0" indent="0">
+              <a:spcBef>
+                <a:spcPts val="0"/>
+              </a:spcBef>
+              <a:spcAft>
+                <a:spcPts val="0"/>
+              </a:spcAft>
+              <a:buNone/>
+            </a:pPr>
+            <a:r>
+              <a:rPr lang="en" sz="1400" dirty="0"/>
+              <a:t>Guess and check a bunch of random allocations and see which one has best SR.</a:t>
+            </a:r>
+            <a:endParaRPr sz="1400" dirty="0"/>
+          </a:p>
+          <a:p>
+            <a:pPr marL="0" lvl="0" indent="0">
+              <a:spcBef>
+                <a:spcPts val="1600"/>
+              </a:spcBef>
+              <a:spcAft>
+                <a:spcPts val="0"/>
+              </a:spcAft>
+              <a:buNone/>
+            </a:pPr>
+            <a:r>
+              <a:rPr lang="en" sz="1400" dirty="0"/>
+              <a:t>Monte Carlo Simulation - Randomly Assign a weight to each security in the portfolio and calculate mean daily return and std. Dev. of daily return.</a:t>
+            </a:r>
+            <a:endParaRPr sz="1400" dirty="0"/>
+          </a:p>
+          <a:p>
+            <a:pPr marL="0" lvl="0" indent="0">
+              <a:spcBef>
+                <a:spcPts val="1600"/>
+              </a:spcBef>
+              <a:spcAft>
+                <a:spcPts val="0"/>
+              </a:spcAft>
+              <a:buNone/>
+            </a:pPr>
+            <a:r>
+              <a:rPr lang="en" sz="1400" dirty="0"/>
+              <a:t>Calculate Sharpe Ratio for thousands of randomly selected allocations and Plot them.</a:t>
+            </a:r>
+            <a:endParaRPr sz="1400" dirty="0"/>
+          </a:p>
+          <a:p>
+            <a:pPr marL="0" lvl="0" indent="0">
+              <a:spcBef>
+                <a:spcPts val="1600"/>
+              </a:spcBef>
+              <a:spcAft>
+                <a:spcPts val="0"/>
+              </a:spcAft>
+              <a:buNone/>
+            </a:pPr>
+            <a:r>
+              <a:rPr lang="en" sz="1400" dirty="0"/>
+              <a:t>Guessing and checking is not effective, so we use math to find out optimal SR for a given portfolio using optimization algorithms.</a:t>
+            </a:r>
+            <a:endParaRPr sz="1400" dirty="0"/>
+          </a:p>
+          <a:p>
+            <a:pPr marL="0" lvl="0" indent="0">
+              <a:spcBef>
+                <a:spcPts val="1600"/>
+              </a:spcBef>
+              <a:spcAft>
+                <a:spcPts val="0"/>
+              </a:spcAft>
+              <a:buNone/>
+            </a:pPr>
+            <a:endParaRPr sz="1400" dirty="0"/>
+          </a:p>
+          <a:p>
+            <a:pPr marL="0" lvl="0" indent="0">
+              <a:spcBef>
+                <a:spcPts val="1600"/>
+              </a:spcBef>
+              <a:spcAft>
+                <a:spcPts val="1600"/>
+              </a:spcAft>
+              <a:buNone/>
+            </a:pPr>
+            <a:endParaRPr sz="1400" dirty="0"/>
+          </a:p>
+        </p:txBody>
+      </p:sp>
+      <p:pic>
+        <p:nvPicPr>
+          <p:cNvPr id="86" name="Shape 86"/>
+          <p:cNvPicPr preferRelativeResize="0"/>
+          <p:nvPr/>
+        </p:nvPicPr>
+        <p:blipFill>
+          <a:blip r:embed="rId3">
+            <a:alphaModFix/>
+          </a:blip>
+          <a:stretch>
+            <a:fillRect/>
+          </a:stretch>
+        </p:blipFill>
+        <p:spPr>
+          <a:xfrm>
+            <a:off x="5202989" y="871474"/>
+            <a:ext cx="3690204" cy="3491520"/>
+          </a:xfrm>
+          <a:prstGeom prst="rect">
+            <a:avLst/>
+          </a:prstGeom>
+          <a:noFill/>
+          <a:ln>
+            <a:noFill/>
+          </a:ln>
+        </p:spPr>
+      </p:pic>
+    </p:spTree>
+  </p:cSld>
+  <p:clrMapOvr>
+    <a:masterClrMapping/>
+  </p:clrMapOvr>
+</p:sld>
+</file>
+
+<file path=ppt/slides/slide18.xml><?xml version="1.0" encoding="utf-8"?>
 <p:sld xmlns:a="http://schemas.openxmlformats.org/drawingml/2006/main" xmlns:r="http://schemas.openxmlformats.org/officeDocument/2006/relationships" xmlns:p="http://schemas.openxmlformats.org/presentationml/2006/main">
   <p:cSld>
     <p:spTree>
@@ -7152,12 +8052,12 @@
 </p:sld>
 </file>
 
-<file path=ppt/slides/slide15.xml><?xml version="1.0" encoding="utf-8"?>
+<file path=ppt/slides/slide19.xml><?xml version="1.0" encoding="utf-8"?>
 <p:sld xmlns:a="http://schemas.openxmlformats.org/drawingml/2006/main" xmlns:r="http://schemas.openxmlformats.org/officeDocument/2006/relationships" xmlns:p="http://schemas.openxmlformats.org/presentationml/2006/main">
   <p:cSld>
     <p:spTree>
       <p:nvGrpSpPr>
-        <p:cNvPr id="1" name="Shape 83"/>
+        <p:cNvPr id="1" name=""/>
         <p:cNvGrpSpPr/>
         <p:nvPr/>
       </p:nvGrpSpPr>
@@ -7171,189 +8071,190 @@
       </p:grpSpPr>
       <p:sp>
         <p:nvSpPr>
-          <p:cNvPr id="84" name="Shape 84"/>
-          <p:cNvSpPr txBox="1">
+          <p:cNvPr id="2" name="Title 1">
+            <a:extLst>
+              <a:ext uri="{FF2B5EF4-FFF2-40B4-BE49-F238E27FC236}">
+                <a16:creationId xmlns:a16="http://schemas.microsoft.com/office/drawing/2014/main" id="{E2813166-8D59-491D-829F-DE4C97DF18E9}"/>
+              </a:ext>
+            </a:extLst>
+          </p:cNvPr>
+          <p:cNvSpPr>
             <a:spLocks noGrp="1"/>
           </p:cNvSpPr>
           <p:nvPr>
             <p:ph type="title"/>
           </p:nvPr>
         </p:nvSpPr>
-        <p:spPr>
-          <a:xfrm>
-            <a:off x="311700" y="445025"/>
-            <a:ext cx="8520600" cy="572700"/>
-          </a:xfrm>
-          <a:prstGeom prst="rect">
-            <a:avLst/>
-          </a:prstGeom>
-        </p:spPr>
+        <p:spPr/>
         <p:txBody>
-          <a:bodyPr spcFirstLastPara="1" wrap="square" lIns="91425" tIns="91425" rIns="91425" bIns="91425" anchor="t" anchorCtr="0">
-            <a:noAutofit/>
-          </a:bodyPr>
+          <a:bodyPr/>
           <a:lstStyle/>
           <a:p>
-            <a:pPr marL="0" lvl="0" indent="0">
-              <a:spcBef>
-                <a:spcPts val="0"/>
-              </a:spcBef>
-              <a:spcAft>
-                <a:spcPts val="0"/>
-              </a:spcAft>
-              <a:buNone/>
-            </a:pPr>
-            <a:r>
-              <a:rPr lang="en"/>
-              <a:t>Portfolio Optimization</a:t>
-            </a:r>
-            <a:endParaRPr/>
+            <a:endParaRPr lang="en-US"/>
           </a:p>
         </p:txBody>
       </p:sp>
       <p:sp>
         <p:nvSpPr>
-          <p:cNvPr id="85" name="Shape 85"/>
-          <p:cNvSpPr txBox="1">
+          <p:cNvPr id="3" name="Text Placeholder 2">
+            <a:extLst>
+              <a:ext uri="{FF2B5EF4-FFF2-40B4-BE49-F238E27FC236}">
+                <a16:creationId xmlns:a16="http://schemas.microsoft.com/office/drawing/2014/main" id="{285DF0E5-F851-4E23-8DCD-E027B2D6AB75}"/>
+              </a:ext>
+            </a:extLst>
+          </p:cNvPr>
+          <p:cNvSpPr>
             <a:spLocks noGrp="1"/>
           </p:cNvSpPr>
           <p:nvPr>
             <p:ph type="body" idx="1"/>
           </p:nvPr>
         </p:nvSpPr>
-        <p:spPr>
-          <a:xfrm>
-            <a:off x="311700" y="1152475"/>
-            <a:ext cx="4848511" cy="3416400"/>
-          </a:xfrm>
-          <a:prstGeom prst="rect">
-            <a:avLst/>
-          </a:prstGeom>
-        </p:spPr>
+        <p:spPr/>
         <p:txBody>
-          <a:bodyPr spcFirstLastPara="1" wrap="square" lIns="91425" tIns="91425" rIns="91425" bIns="91425" anchor="t" anchorCtr="0">
-            <a:noAutofit/>
-          </a:bodyPr>
+          <a:bodyPr/>
           <a:lstStyle/>
           <a:p>
-            <a:pPr marL="0" lvl="0" indent="0">
-              <a:spcBef>
-                <a:spcPts val="0"/>
-              </a:spcBef>
-              <a:spcAft>
-                <a:spcPts val="0"/>
-              </a:spcAft>
-              <a:buNone/>
-            </a:pPr>
-            <a:r>
-              <a:rPr lang="en" dirty="0"/>
-              <a:t>Guess and check a bunch of random allocations and see which one has best SR.</a:t>
-            </a:r>
-            <a:endParaRPr dirty="0"/>
-          </a:p>
-          <a:p>
-            <a:pPr marL="0" lvl="0" indent="0">
-              <a:spcBef>
-                <a:spcPts val="1600"/>
-              </a:spcBef>
-              <a:spcAft>
-                <a:spcPts val="0"/>
-              </a:spcAft>
-              <a:buNone/>
-            </a:pPr>
-            <a:r>
-              <a:rPr lang="en" dirty="0"/>
-              <a:t>Monte Carlo Simulation - Randomly Assign a weight to each security in the portfolio and calculate mean daily return and std. Dev. of daily return.</a:t>
-            </a:r>
-            <a:endParaRPr dirty="0"/>
-          </a:p>
-          <a:p>
-            <a:pPr marL="0" lvl="0" indent="0">
-              <a:spcBef>
-                <a:spcPts val="1600"/>
-              </a:spcBef>
-              <a:spcAft>
-                <a:spcPts val="0"/>
-              </a:spcAft>
-              <a:buNone/>
-            </a:pPr>
-            <a:r>
-              <a:rPr lang="en" dirty="0"/>
-              <a:t>Calculate Sharpe Ratio for thousands of randomly selected allocations and Plot them.</a:t>
-            </a:r>
-            <a:endParaRPr dirty="0"/>
-          </a:p>
-          <a:p>
-            <a:pPr marL="0" lvl="0" indent="0">
-              <a:spcBef>
-                <a:spcPts val="1600"/>
-              </a:spcBef>
-              <a:spcAft>
-                <a:spcPts val="0"/>
-              </a:spcAft>
-              <a:buNone/>
-            </a:pPr>
-            <a:r>
-              <a:rPr lang="en" dirty="0"/>
-              <a:t>Guessing and checking is not effective, so we use math to find out optimal SR for a given portfolio using optimization algorithms.</a:t>
-            </a:r>
-            <a:endParaRPr dirty="0"/>
-          </a:p>
-          <a:p>
-            <a:pPr marL="0" lvl="0" indent="0">
-              <a:spcBef>
-                <a:spcPts val="1600"/>
-              </a:spcBef>
-              <a:spcAft>
-                <a:spcPts val="0"/>
-              </a:spcAft>
-              <a:buNone/>
-            </a:pPr>
-            <a:endParaRPr dirty="0"/>
-          </a:p>
-          <a:p>
-            <a:pPr marL="0" lvl="0" indent="0">
-              <a:spcBef>
-                <a:spcPts val="1600"/>
-              </a:spcBef>
-              <a:spcAft>
-                <a:spcPts val="1600"/>
-              </a:spcAft>
-              <a:buNone/>
-            </a:pPr>
-            <a:endParaRPr dirty="0"/>
+            <a:r>
+              <a:rPr lang="en-US" sz="1600" dirty="0"/>
+              <a:t>Returns: If we started with $10,000 you finished with $10,470</a:t>
+            </a:r>
+          </a:p>
+          <a:p>
+            <a:r>
+              <a:rPr lang="en-US" sz="1600" dirty="0"/>
+              <a:t>Alpha: +</a:t>
+            </a:r>
+            <a:r>
+              <a:rPr lang="en-US" sz="1600" dirty="0" err="1"/>
+              <a:t>ve</a:t>
+            </a:r>
+            <a:r>
+              <a:rPr lang="en-US" sz="1600" dirty="0"/>
+              <a:t> Alpha means we had a return in excess of what would be assumed for the risk you took</a:t>
+            </a:r>
+          </a:p>
+          <a:p>
+            <a:r>
+              <a:rPr lang="en-US" sz="1600" dirty="0"/>
+              <a:t>Beta: -</a:t>
+            </a:r>
+            <a:r>
+              <a:rPr lang="en-US" sz="1600" dirty="0" err="1"/>
+              <a:t>ve</a:t>
+            </a:r>
+            <a:r>
+              <a:rPr lang="en-US" sz="1600" dirty="0"/>
+              <a:t> Beta means your </a:t>
+            </a:r>
+            <a:r>
+              <a:rPr lang="en-US" sz="1600" dirty="0" err="1"/>
+              <a:t>algo</a:t>
+            </a:r>
+            <a:r>
+              <a:rPr lang="en-US" sz="1600" dirty="0"/>
+              <a:t> is producing returns opposite to the benchmark i.e. -</a:t>
+            </a:r>
+            <a:r>
+              <a:rPr lang="en-US" sz="1600" dirty="0" err="1"/>
+              <a:t>ve</a:t>
+            </a:r>
+            <a:r>
+              <a:rPr lang="en-US" sz="1600" dirty="0"/>
+              <a:t> returns when the benchmark has +</a:t>
+            </a:r>
+            <a:r>
+              <a:rPr lang="en-US" sz="1600" dirty="0" err="1"/>
+              <a:t>ve</a:t>
+            </a:r>
+            <a:r>
+              <a:rPr lang="en-US" sz="1600" dirty="0"/>
+              <a:t> returns and vice versa</a:t>
+            </a:r>
+          </a:p>
+          <a:p>
+            <a:r>
+              <a:rPr lang="en-US" sz="1600" dirty="0"/>
+              <a:t>(Alpha and Beta relate to the Capital Assets Pricing Model (CAPM) and are the intercept (Alpha) and slope (Beta) of a linear regression (see </a:t>
+            </a:r>
+            <a:r>
+              <a:rPr lang="en-US" sz="1600" dirty="0">
+                <a:hlinkClick r:id="rId2"/>
+              </a:rPr>
+              <a:t>http://www.moneychimp.com/articles/risk/regression.htm</a:t>
+            </a:r>
+            <a:r>
+              <a:rPr lang="en-US" sz="1600" dirty="0"/>
+              <a:t> )</a:t>
+            </a:r>
+          </a:p>
+          <a:p>
+            <a:r>
+              <a:rPr lang="en-US" sz="1600" dirty="0"/>
+              <a:t>Sharpe:  Risk-adjusted performance measure i.e. a low Sharpe may suggest a level of risk with which you might not be comfortable</a:t>
+            </a:r>
+          </a:p>
+          <a:p>
+            <a:r>
+              <a:rPr lang="en-US" sz="1600" dirty="0"/>
+              <a:t>Drawdown: the maximum difference between a high and low portfolio value (peak to trough) during a given time period</a:t>
+            </a:r>
+          </a:p>
+          <a:p>
+            <a:r>
+              <a:rPr lang="en-US" sz="1600" dirty="0"/>
+              <a:t>Algorithm: The </a:t>
+            </a:r>
+            <a:r>
+              <a:rPr lang="en-US" sz="1600" dirty="0" err="1"/>
+              <a:t>algo</a:t>
+            </a:r>
+            <a:r>
+              <a:rPr lang="en-US" sz="1600" dirty="0"/>
+              <a:t> returns. This can be a function of your starting capital if you are trading fixed quantities of shares, A $1,000,000 </a:t>
+            </a:r>
+            <a:r>
+              <a:rPr lang="en-US" sz="1600" dirty="0" err="1"/>
+              <a:t>algo</a:t>
+            </a:r>
+            <a:r>
+              <a:rPr lang="en-US" sz="1600" dirty="0"/>
+              <a:t> that loses 8.6% could become a $100,000 </a:t>
+            </a:r>
+            <a:r>
+              <a:rPr lang="en-US" sz="1600" dirty="0" err="1"/>
+              <a:t>algo</a:t>
+            </a:r>
+            <a:r>
+              <a:rPr lang="en-US" sz="1600" dirty="0"/>
+              <a:t> that loses 85.9%.</a:t>
+            </a:r>
+          </a:p>
+          <a:p>
+            <a:r>
+              <a:rPr lang="en-US" sz="1600" dirty="0"/>
+              <a:t>Benchmark: the benchmark returns but at present without dividends reinvested so this figure is lower than it really is and as a result the </a:t>
+            </a:r>
+            <a:r>
+              <a:rPr lang="en-US" sz="1600" dirty="0" err="1"/>
+              <a:t>algo</a:t>
+            </a:r>
+            <a:r>
+              <a:rPr lang="en-US" sz="1600" dirty="0"/>
+              <a:t> returns look better by comparison.</a:t>
+            </a:r>
+          </a:p>
+          <a:p>
+            <a:endParaRPr lang="en-US" sz="1600" dirty="0"/>
           </a:p>
         </p:txBody>
       </p:sp>
-      <p:pic>
-        <p:nvPicPr>
-          <p:cNvPr id="86" name="Shape 86"/>
-          <p:cNvPicPr preferRelativeResize="0"/>
-          <p:nvPr/>
-        </p:nvPicPr>
-        <p:blipFill>
-          <a:blip r:embed="rId3">
-            <a:alphaModFix/>
-          </a:blip>
-          <a:stretch>
-            <a:fillRect/>
-          </a:stretch>
-        </p:blipFill>
-        <p:spPr>
-          <a:xfrm>
-            <a:off x="5202989" y="871474"/>
-            <a:ext cx="4168460" cy="3545452"/>
-          </a:xfrm>
-          <a:prstGeom prst="rect">
-            <a:avLst/>
-          </a:prstGeom>
-          <a:noFill/>
-          <a:ln>
-            <a:noFill/>
-          </a:ln>
-        </p:spPr>
-      </p:pic>
     </p:spTree>
+    <p:extLst>
+      <p:ext uri="{BB962C8B-B14F-4D97-AF65-F5344CB8AC3E}">
+        <p14:creationId xmlns:p14="http://schemas.microsoft.com/office/powerpoint/2010/main" val="4253167256"/>
+      </p:ext>
+    </p:extLst>
   </p:cSld>
   <p:clrMapOvr>
     <a:masterClrMapping/>
@@ -7410,9 +8311,7 @@
             <a:r>
               <a:rPr lang="en-US" sz="2400" b="1" dirty="0">
                 <a:solidFill>
-                  <a:schemeClr val="accent5">
-                    <a:lumMod val="75000"/>
-                  </a:schemeClr>
+                  <a:schemeClr val="accent5"/>
                 </a:solidFill>
               </a:rPr>
               <a:t>Introduction</a:t>
@@ -7599,9 +8498,7 @@
             <a:r>
               <a:rPr lang="en-US" sz="3600" b="1" dirty="0">
                 <a:solidFill>
-                  <a:schemeClr val="accent5">
-                    <a:lumMod val="75000"/>
-                  </a:schemeClr>
+                  <a:schemeClr val="accent5"/>
                 </a:solidFill>
               </a:rPr>
               <a:t>Basic Methods</a:t>
@@ -7668,18 +8565,14 @@
             <a:r>
               <a:rPr lang="en-US" sz="2400" b="1" dirty="0">
                 <a:solidFill>
-                  <a:schemeClr val="accent5">
-                    <a:lumMod val="75000"/>
-                  </a:schemeClr>
+                  <a:schemeClr val="accent5"/>
                 </a:solidFill>
               </a:rPr>
               <a:t>Initial Methods</a:t>
             </a:r>
             <a:endParaRPr lang="en-US" sz="2400" dirty="0">
               <a:solidFill>
-                <a:schemeClr val="accent5">
-                  <a:lumMod val="75000"/>
-                </a:schemeClr>
+                <a:schemeClr val="accent5"/>
               </a:solidFill>
             </a:endParaRPr>
           </a:p>
@@ -7734,7 +8627,24 @@
             </a:r>
             <a:r>
               <a:rPr lang="en-US" dirty="0"/>
-              <a:t>”: Dictionary - which can be passed to all methods in your algorithm. </a:t>
+              <a:t>”: Dictionary which can be passed to all methods in your algorithm.</a:t>
+            </a:r>
+          </a:p>
+          <a:p>
+            <a:pPr marL="114300" indent="0">
+              <a:buNone/>
+            </a:pPr>
+            <a:r>
+              <a:rPr lang="en-US" dirty="0"/>
+              <a:t>      “</a:t>
+            </a:r>
+            <a:r>
+              <a:rPr lang="en-US" b="1" dirty="0" err="1"/>
+              <a:t>sid</a:t>
+            </a:r>
+            <a:r>
+              <a:rPr lang="en-US" dirty="0"/>
+              <a:t>”: Refers to security id for a particular Stock.</a:t>
             </a:r>
           </a:p>
           <a:p>
@@ -7756,13 +8666,15 @@
             <a:endParaRPr lang="en-US" dirty="0"/>
           </a:p>
           <a:p>
-            <a:r>
-              <a:rPr lang="en-US" b="1" dirty="0" err="1"/>
-              <a:t>handle_data</a:t>
-            </a:r>
+            <a:pPr marL="114300" indent="0">
+              <a:buNone/>
+            </a:pPr>
+            <a:endParaRPr lang="en-US" dirty="0"/>
+          </a:p>
+          <a:p>
             <a:r>
               <a:rPr lang="en-US" b="1" dirty="0"/>
-              <a:t>(context, data) : </a:t>
+              <a:t>handle_data(context, data) : </a:t>
             </a:r>
             <a:r>
               <a:rPr lang="en-US" dirty="0"/>
@@ -7783,11 +8695,8 @@
             </a:r>
             <a:r>
               <a:rPr lang="en-US" dirty="0"/>
-              <a:t>Optional. Called daily prior to the open of market. Orders cannot be placed inside this method. The primary purpose of this method is to use Pipeline to create a set of securities that your algorithm will use.</a:t>
-            </a:r>
-          </a:p>
-          <a:p>
-            <a:endParaRPr lang="en-US" dirty="0"/>
+              <a:t>Optional. Called daily prior to the open of market. Orders cannot be placed inside this method.</a:t>
+            </a:r>
           </a:p>
         </p:txBody>
       </p:sp>
@@ -7813,7 +8722,7 @@
         </p:blipFill>
         <p:spPr>
           <a:xfrm>
-            <a:off x="3082830" y="1699112"/>
+            <a:off x="3020130" y="2185047"/>
             <a:ext cx="2340860" cy="553693"/>
           </a:xfrm>
           <a:prstGeom prst="rect">
@@ -7843,7 +8752,7 @@
         </p:blipFill>
         <p:spPr>
           <a:xfrm>
-            <a:off x="2257259" y="2332256"/>
+            <a:off x="2288609" y="2886119"/>
             <a:ext cx="3903175" cy="434925"/>
           </a:xfrm>
           <a:prstGeom prst="rect">
@@ -7905,17 +8814,23 @@
             <a:r>
               <a:rPr lang="en-US" sz="2400" b="1" dirty="0">
                 <a:solidFill>
-                  <a:schemeClr val="accent5">
-                    <a:lumMod val="75000"/>
-                  </a:schemeClr>
+                  <a:schemeClr val="accent5"/>
                 </a:solidFill>
               </a:rPr>
               <a:t>Data Methods</a:t>
             </a:r>
             <a:br>
-              <a:rPr lang="en-US" sz="2400" b="1" dirty="0"/>
+              <a:rPr lang="en-US" sz="2400" b="1" dirty="0">
+                <a:solidFill>
+                  <a:schemeClr val="accent5"/>
+                </a:solidFill>
+              </a:rPr>
             </a:br>
-            <a:endParaRPr lang="en-US" sz="2400" dirty="0"/>
+            <a:endParaRPr lang="en-US" sz="2400" dirty="0">
+              <a:solidFill>
+                <a:schemeClr val="accent5"/>
+              </a:solidFill>
+            </a:endParaRPr>
           </a:p>
         </p:txBody>
       </p:sp>
@@ -7935,7 +8850,12 @@
             <p:ph type="body" idx="1"/>
           </p:nvPr>
         </p:nvSpPr>
-        <p:spPr/>
+        <p:spPr>
+          <a:xfrm>
+            <a:off x="311700" y="985275"/>
+            <a:ext cx="8520600" cy="3416400"/>
+          </a:xfrm>
+        </p:spPr>
         <p:txBody>
           <a:bodyPr/>
           <a:lstStyle/>
@@ -7994,7 +8914,7 @@
             </a:r>
             <a:r>
               <a:rPr lang="en-US" dirty="0"/>
-              <a:t>Returns a window of data for the given assets and fields. </a:t>
+              <a:t>Returns a window of data for the given assets and fields.</a:t>
             </a:r>
             <a:endParaRPr lang="en-US" b="1" dirty="0"/>
           </a:p>
@@ -8077,18 +8997,14 @@
             <a:r>
               <a:rPr lang="en-US" sz="2400" b="1" dirty="0">
                 <a:solidFill>
-                  <a:schemeClr val="accent5">
-                    <a:lumMod val="75000"/>
-                  </a:schemeClr>
+                  <a:schemeClr val="accent5"/>
                 </a:solidFill>
               </a:rPr>
               <a:t>Order Methods</a:t>
             </a:r>
             <a:endParaRPr lang="en-US" sz="2400" dirty="0">
               <a:solidFill>
-                <a:schemeClr val="accent5">
-                  <a:lumMod val="75000"/>
-                </a:schemeClr>
+                <a:schemeClr val="accent5"/>
               </a:solidFill>
             </a:endParaRPr>
           </a:p>
@@ -8112,8 +9028,8 @@
         </p:nvSpPr>
         <p:spPr>
           <a:xfrm>
-            <a:off x="306475" y="985263"/>
-            <a:ext cx="8520600" cy="3416400"/>
+            <a:off x="306475" y="985262"/>
+            <a:ext cx="8520600" cy="3686015"/>
           </a:xfrm>
         </p:spPr>
         <p:txBody>
@@ -8122,7 +9038,7 @@
           <a:p>
             <a:r>
               <a:rPr lang="en-US" sz="1600" b="1" dirty="0"/>
-              <a:t>order(asset, amount, style=OrderType): </a:t>
+              <a:t>order(asset, amount): </a:t>
             </a:r>
             <a:r>
               <a:rPr lang="en-US" sz="1600" dirty="0"/>
@@ -8135,7 +9051,7 @@
           <a:p>
             <a:r>
               <a:rPr lang="en-US" sz="1600" b="1" dirty="0"/>
-              <a:t>order_value(asset, amount, style=OrderType): </a:t>
+              <a:t>order_value(asset, amount): </a:t>
             </a:r>
             <a:r>
               <a:rPr lang="en-US" sz="1600" dirty="0"/>
@@ -8172,26 +9088,9 @@
               <a:t>Similarly, we have: </a:t>
             </a:r>
             <a:r>
-              <a:rPr lang="en-US" sz="1600" b="1" dirty="0" err="1"/>
-              <a:t>order_percent</a:t>
-            </a:r>
-            <a:r>
               <a:rPr lang="en-US" sz="1600" b="1" dirty="0"/>
-              <a:t>, _target, _</a:t>
-            </a:r>
-            <a:r>
-              <a:rPr lang="en-US" sz="1600" b="1" dirty="0" err="1"/>
-              <a:t>target_value</a:t>
-            </a:r>
-            <a:r>
-              <a:rPr lang="en-US" sz="1600" b="1" dirty="0"/>
-              <a:t>, _</a:t>
-            </a:r>
-            <a:r>
-              <a:rPr lang="en-US" sz="1600" b="1" dirty="0" err="1"/>
-              <a:t>target_percent</a:t>
-            </a:r>
-            <a:endParaRPr lang="en-US" sz="1600" b="1" dirty="0"/>
+              <a:t>order_percent, _target, _target_value, _target_percent</a:t>
+            </a:r>
           </a:p>
           <a:p>
             <a:pPr marL="114300" indent="0">
@@ -8272,9 +9171,7 @@
             <a:r>
               <a:rPr lang="en-US" sz="3200" b="1" dirty="0">
                 <a:solidFill>
-                  <a:schemeClr val="accent5">
-                    <a:lumMod val="75000"/>
-                  </a:schemeClr>
+                  <a:schemeClr val="accent5"/>
                 </a:solidFill>
               </a:rPr>
               <a:t>Building Algorithm</a:t>
@@ -8341,9 +9238,7 @@
             <a:r>
               <a:rPr lang="en-US" sz="2400" b="1" dirty="0">
                 <a:solidFill>
-                  <a:schemeClr val="accent5">
-                    <a:lumMod val="75000"/>
-                  </a:schemeClr>
+                  <a:schemeClr val="accent5"/>
                 </a:solidFill>
               </a:rPr>
               <a:t>Initializing &amp; Scheduling</a:t>
@@ -8370,7 +9265,7 @@
         <p:spPr>
           <a:xfrm>
             <a:off x="306475" y="844198"/>
-            <a:ext cx="8520600" cy="1904234"/>
+            <a:ext cx="8520600" cy="4349594"/>
           </a:xfrm>
         </p:spPr>
         <p:txBody>
@@ -8395,7 +9290,7 @@
             </a:r>
             <a:r>
               <a:rPr lang="en-US" sz="1600" dirty="0"/>
-              <a:t> Sets benchmark for back testing, declares “context” objects to access its values in other methods and write scheduling logic.</a:t>
+              <a:t> Set benchmark for back testing, declare “context” object to access its values in other methods and write scheduling logic.</a:t>
             </a:r>
           </a:p>
           <a:p>
@@ -8442,7 +9337,7 @@
           <a:p>
             <a:r>
               <a:rPr lang="en-US" sz="1600" dirty="0"/>
-              <a:t>Above example sets SPY (S&amp;P 500) as a benchmark and interested to backtest “AAPL” stock trade every day after one hour of market opens.</a:t>
+              <a:t>Above example sets SPY (S&amp;P 500) as a benchmark and interested to start trading “AAPL” stock every day after one hour of market opens.</a:t>
             </a:r>
           </a:p>
           <a:p>
@@ -8531,7 +9426,7 @@
         </p:nvSpPr>
         <p:spPr>
           <a:xfrm>
-            <a:off x="311700" y="356200"/>
+            <a:off x="311700" y="236025"/>
             <a:ext cx="8520600" cy="572700"/>
           </a:xfrm>
         </p:spPr>
@@ -8542,9 +9437,7 @@
             <a:r>
               <a:rPr lang="en-US" sz="2400" b="1" dirty="0">
                 <a:solidFill>
-                  <a:schemeClr val="accent5">
-                    <a:lumMod val="75000"/>
-                  </a:schemeClr>
+                  <a:schemeClr val="accent5"/>
                 </a:solidFill>
               </a:rPr>
               <a:t>Data</a:t>
@@ -8552,9 +9445,7 @@
             <a:r>
               <a:rPr lang="en-US" b="1" dirty="0">
                 <a:solidFill>
-                  <a:schemeClr val="accent5">
-                    <a:lumMod val="75000"/>
-                  </a:schemeClr>
+                  <a:schemeClr val="accent5"/>
                 </a:solidFill>
               </a:rPr>
               <a:t> </a:t>
@@ -8562,18 +9453,14 @@
             <a:r>
               <a:rPr lang="en-US" sz="2400" b="1" dirty="0">
                 <a:solidFill>
-                  <a:schemeClr val="accent5">
-                    <a:lumMod val="75000"/>
-                  </a:schemeClr>
+                  <a:schemeClr val="accent5"/>
                 </a:solidFill>
               </a:rPr>
               <a:t>Extraction</a:t>
             </a:r>
             <a:endParaRPr lang="en-US" b="1" dirty="0">
               <a:solidFill>
-                <a:schemeClr val="accent5">
-                  <a:lumMod val="75000"/>
-                </a:schemeClr>
+                <a:schemeClr val="accent5"/>
               </a:solidFill>
             </a:endParaRPr>
           </a:p>
@@ -8601,8 +9488,8 @@
         </p:blipFill>
         <p:spPr>
           <a:xfrm>
-            <a:off x="2241430" y="3015071"/>
-            <a:ext cx="4399725" cy="1934599"/>
+            <a:off x="2080252" y="2847703"/>
+            <a:ext cx="4780358" cy="2101967"/>
           </a:xfrm>
           <a:prstGeom prst="rect">
             <a:avLst/>
@@ -8627,8 +9514,8 @@
         </p:nvSpPr>
         <p:spPr>
           <a:xfrm>
-            <a:off x="228098" y="919637"/>
-            <a:ext cx="8769597" cy="2180985"/>
+            <a:off x="149722" y="782596"/>
+            <a:ext cx="8900226" cy="2180985"/>
           </a:xfrm>
         </p:spPr>
         <p:txBody>
@@ -8645,7 +9532,7 @@
             </a:r>
             <a:r>
               <a:rPr lang="en-US" dirty="0"/>
-              <a:t>” extracts historical “price” data of  “AAPL” stock using “sid” passed through “context” for last 50 records with frequency 1 day is extracted. We calculate mean-price for last 50, 20 days as </a:t>
+              <a:t>”: extracts historical “price” data of  “AAPL” stock using “sid” passed through “context” for last n records with frequency 1 day is extracted. We calculated below mean-price for last 50, 20 days as </a:t>
             </a:r>
             <a:r>
               <a:rPr lang="en-US" b="1" dirty="0"/>

</xml_diff>